<commit_message>
fit text into margins
</commit_message>
<xml_diff>
--- a/07_useful_statistics_and_error_analysis.pptx
+++ b/07_useful_statistics_and_error_analysis.pptx
@@ -3586,7 +3586,7 @@
         <p:spPr>
           <a:xfrm>
             <a:off x="0" y="6560280"/>
-            <a:ext cx="12190680" cy="296280"/>
+            <a:ext cx="12190320" cy="295920"/>
           </a:xfrm>
           <a:prstGeom prst="rect">
             <a:avLst/>
@@ -3622,7 +3622,7 @@
         <p:spPr>
           <a:xfrm>
             <a:off x="0" y="0"/>
-            <a:ext cx="12190680" cy="620640"/>
+            <a:ext cx="12190320" cy="620280"/>
           </a:xfrm>
           <a:prstGeom prst="rect">
             <a:avLst/>
@@ -3658,7 +3658,7 @@
         <p:spPr>
           <a:xfrm>
             <a:off x="783000" y="60120"/>
-            <a:ext cx="6592320" cy="502920"/>
+            <a:ext cx="6591960" cy="502560"/>
           </a:xfrm>
           <a:prstGeom prst="rect">
             <a:avLst/>
@@ -3688,7 +3688,7 @@
         <p:spPr>
           <a:xfrm>
             <a:off x="11450880" y="6592320"/>
-            <a:ext cx="649440" cy="232200"/>
+            <a:ext cx="649080" cy="231840"/>
           </a:xfrm>
           <a:prstGeom prst="rect">
             <a:avLst/>
@@ -4017,7 +4017,7 @@
         <p:spPr>
           <a:xfrm>
             <a:off x="0" y="6560280"/>
-            <a:ext cx="12190680" cy="296280"/>
+            <a:ext cx="12190320" cy="295920"/>
           </a:xfrm>
           <a:prstGeom prst="rect">
             <a:avLst/>
@@ -4053,7 +4053,7 @@
         <p:spPr>
           <a:xfrm>
             <a:off x="0" y="0"/>
-            <a:ext cx="12190680" cy="620640"/>
+            <a:ext cx="12190320" cy="620280"/>
           </a:xfrm>
           <a:prstGeom prst="rect">
             <a:avLst/>
@@ -4089,7 +4089,7 @@
         <p:spPr>
           <a:xfrm>
             <a:off x="783000" y="60120"/>
-            <a:ext cx="6592320" cy="502920"/>
+            <a:ext cx="6591960" cy="502560"/>
           </a:xfrm>
           <a:prstGeom prst="rect">
             <a:avLst/>
@@ -4119,7 +4119,7 @@
         <p:spPr>
           <a:xfrm>
             <a:off x="11450880" y="6592320"/>
-            <a:ext cx="649440" cy="232200"/>
+            <a:ext cx="649080" cy="231840"/>
           </a:xfrm>
           <a:prstGeom prst="rect">
             <a:avLst/>
@@ -4445,7 +4445,7 @@
         <p:spPr>
           <a:xfrm>
             <a:off x="695160" y="2514600"/>
-            <a:ext cx="8904960" cy="493920"/>
+            <a:ext cx="8904600" cy="493560"/>
           </a:xfrm>
           <a:prstGeom prst="rect">
             <a:avLst/>
@@ -4525,7 +4525,7 @@
         <p:spPr>
           <a:xfrm>
             <a:off x="506160" y="69120"/>
-            <a:ext cx="8904960" cy="493920"/>
+            <a:ext cx="8904600" cy="493560"/>
           </a:xfrm>
           <a:prstGeom prst="rect">
             <a:avLst/>
@@ -4570,7 +4570,7 @@
         <p:spPr>
           <a:xfrm>
             <a:off x="457560" y="1170360"/>
-            <a:ext cx="11734200" cy="429480"/>
+            <a:ext cx="11733840" cy="429120"/>
           </a:xfrm>
           <a:prstGeom prst="rect">
             <a:avLst/>
@@ -4865,7 +4865,7 @@
         <p:spPr>
           <a:xfrm>
             <a:off x="506160" y="69120"/>
-            <a:ext cx="8904960" cy="493920"/>
+            <a:ext cx="8904600" cy="493560"/>
           </a:xfrm>
           <a:prstGeom prst="rect">
             <a:avLst/>
@@ -4910,7 +4910,7 @@
         <p:spPr>
           <a:xfrm>
             <a:off x="457200" y="1788840"/>
-            <a:ext cx="10514880" cy="429480"/>
+            <a:ext cx="10514520" cy="429120"/>
           </a:xfrm>
           <a:prstGeom prst="rect">
             <a:avLst/>
@@ -4965,19 +4965,8 @@
                 <a:latin typeface="Arial"/>
                 <a:ea typeface="DejaVu Sans"/>
               </a:rPr>
-              <a:t> shows the probability that the value is x or lower: F(x) = P(X &lt;= x)</a:t>
-            </a:r>
-            <a:endParaRPr b="0" lang="en-US" sz="2400" spc="-1" strike="noStrike">
-              <a:latin typeface="Arial"/>
-            </a:endParaRPr>
-          </a:p>
-          <a:p>
-            <a:pPr>
-              <a:lnSpc>
-                <a:spcPct val="100000"/>
-              </a:lnSpc>
-              <a:buNone/>
-            </a:pPr>
+              <a:t> shows </a:t>
+            </a:r>
             <a:endParaRPr b="0" lang="en-US" sz="2400" spc="-1" strike="noStrike">
               <a:latin typeface="Arial"/>
             </a:endParaRPr>
@@ -4997,7 +4986,60 @@
                 <a:latin typeface="Arial"/>
                 <a:ea typeface="DejaVu Sans"/>
               </a:rPr>
-              <a:t>When we observe a batch of data, we can compute and graph this over a range of values for x. Called the</a:t>
+              <a:t>the probability that the value is x or lower: F(x) = P(X &lt;= x)</a:t>
+            </a:r>
+            <a:endParaRPr b="0" lang="en-US" sz="2400" spc="-1" strike="noStrike">
+              <a:latin typeface="Arial"/>
+            </a:endParaRPr>
+          </a:p>
+          <a:p>
+            <a:pPr>
+              <a:lnSpc>
+                <a:spcPct val="100000"/>
+              </a:lnSpc>
+              <a:buNone/>
+            </a:pPr>
+            <a:endParaRPr b="0" lang="en-US" sz="2400" spc="-1" strike="noStrike">
+              <a:latin typeface="Arial"/>
+            </a:endParaRPr>
+          </a:p>
+          <a:p>
+            <a:pPr>
+              <a:lnSpc>
+                <a:spcPct val="100000"/>
+              </a:lnSpc>
+              <a:buNone/>
+            </a:pPr>
+            <a:r>
+              <a:rPr b="0" lang="en-US" sz="2400" spc="-1" strike="noStrike">
+                <a:solidFill>
+                  <a:srgbClr val="000000"/>
+                </a:solidFill>
+                <a:latin typeface="Arial"/>
+                <a:ea typeface="DejaVu Sans"/>
+              </a:rPr>
+              <a:t>When we observe a batch of data, we can compute and graph this </a:t>
+            </a:r>
+            <a:endParaRPr b="0" lang="en-US" sz="2400" spc="-1" strike="noStrike">
+              <a:latin typeface="Arial"/>
+            </a:endParaRPr>
+          </a:p>
+          <a:p>
+            <a:pPr>
+              <a:lnSpc>
+                <a:spcPct val="100000"/>
+              </a:lnSpc>
+              <a:buNone/>
+            </a:pPr>
+            <a:r>
+              <a:rPr b="0" lang="en-US" sz="2400" spc="-1" strike="noStrike">
+                <a:solidFill>
+                  <a:srgbClr val="000000"/>
+                </a:solidFill>
+                <a:latin typeface="Arial"/>
+                <a:ea typeface="DejaVu Sans"/>
+              </a:rPr>
+              <a:t>over a range of values for x. Called the</a:t>
             </a:r>
             <a:r>
               <a:rPr b="1" lang="en-US" sz="2400" spc="-1" strike="noStrike">
@@ -5049,7 +5091,28 @@
                 <a:latin typeface="Arial"/>
                 <a:ea typeface="DejaVu Sans"/>
               </a:rPr>
-              <a:t>This provides much richer information than the mean, as we can see the data across all percentiles.</a:t>
+              <a:t>This provides much richer information than the mean, as we can </a:t>
+            </a:r>
+            <a:endParaRPr b="0" lang="en-US" sz="2400" spc="-1" strike="noStrike">
+              <a:latin typeface="Arial"/>
+            </a:endParaRPr>
+          </a:p>
+          <a:p>
+            <a:pPr>
+              <a:lnSpc>
+                <a:spcPct val="100000"/>
+              </a:lnSpc>
+              <a:buNone/>
+            </a:pPr>
+            <a:r>
+              <a:rPr b="0" lang="en-US" sz="2400" spc="-1" strike="noStrike">
+                <a:solidFill>
+                  <a:srgbClr val="000000"/>
+                </a:solidFill>
+                <a:latin typeface="Arial"/>
+                <a:ea typeface="DejaVu Sans"/>
+              </a:rPr>
+              <a:t>see the data across all percentiles.</a:t>
             </a:r>
             <a:endParaRPr b="0" lang="en-US" sz="2400" spc="-1" strike="noStrike">
               <a:latin typeface="Arial"/>
@@ -5100,7 +5163,7 @@
         <p:spPr>
           <a:xfrm>
             <a:off x="506160" y="69120"/>
-            <a:ext cx="8904960" cy="493920"/>
+            <a:ext cx="8904600" cy="493560"/>
           </a:xfrm>
           <a:prstGeom prst="rect">
             <a:avLst/>
@@ -5145,7 +5208,7 @@
         <p:spPr>
           <a:xfrm>
             <a:off x="457920" y="1071000"/>
-            <a:ext cx="10514880" cy="429480"/>
+            <a:ext cx="10514520" cy="429120"/>
           </a:xfrm>
           <a:prstGeom prst="rect">
             <a:avLst/>
@@ -5201,7 +5264,7 @@
         <p:spPr>
           <a:xfrm>
             <a:off x="685800" y="1600200"/>
-            <a:ext cx="5486400" cy="3473640"/>
+            <a:ext cx="5486040" cy="3473280"/>
           </a:xfrm>
           <a:prstGeom prst="rect">
             <a:avLst/>
@@ -5220,7 +5283,7 @@
         <p:spPr>
           <a:xfrm>
             <a:off x="6976800" y="1035000"/>
-            <a:ext cx="4800600" cy="457200"/>
+            <a:ext cx="4800240" cy="456840"/>
           </a:xfrm>
           <a:prstGeom prst="rect">
             <a:avLst/>
@@ -5271,7 +5334,7 @@
         </p:nvGraphicFramePr>
         <p:xfrm>
           <a:off x="7100640" y="1635480"/>
-          <a:ext cx="1906920" cy="1723320"/>
+          <a:ext cx="1906560" cy="2140920"/>
         </p:xfrm>
         <a:graphic>
           <a:graphicData uri="http://schemas.openxmlformats.org/drawingml/2006/table">
@@ -5301,7 +5364,7 @@
                         <a:t>median</a:t>
                       </a:r>
                       <a:endParaRPr b="0" lang="en-US" sz="1600" spc="-1" strike="noStrike">
-                        <a:latin typeface="Times New Roman"/>
+                        <a:latin typeface="Arial"/>
                       </a:endParaRPr>
                     </a:p>
                   </a:txBody>
@@ -5350,7 +5413,7 @@
                         <a:t>30.42</a:t>
                       </a:r>
                       <a:endParaRPr b="0" lang="en-US" sz="1600" spc="-1" strike="noStrike">
-                        <a:latin typeface="Times New Roman"/>
+                        <a:latin typeface="Arial"/>
                       </a:endParaRPr>
                     </a:p>
                   </a:txBody>
@@ -5401,7 +5464,7 @@
                         <a:t>75%ile</a:t>
                       </a:r>
                       <a:endParaRPr b="0" lang="en-US" sz="1600" spc="-1" strike="noStrike">
-                        <a:latin typeface="Times New Roman"/>
+                        <a:latin typeface="Arial"/>
                       </a:endParaRPr>
                     </a:p>
                   </a:txBody>
@@ -5450,7 +5513,7 @@
                         <a:t>54.90</a:t>
                       </a:r>
                       <a:endParaRPr b="0" lang="en-US" sz="1600" spc="-1" strike="noStrike">
-                        <a:latin typeface="Times New Roman"/>
+                        <a:latin typeface="Arial"/>
                       </a:endParaRPr>
                     </a:p>
                   </a:txBody>
@@ -5501,7 +5564,7 @@
                         <a:t>90%ile</a:t>
                       </a:r>
                       <a:endParaRPr b="0" lang="en-US" sz="1600" spc="-1" strike="noStrike">
-                        <a:latin typeface="Times New Roman"/>
+                        <a:latin typeface="Arial"/>
                       </a:endParaRPr>
                     </a:p>
                   </a:txBody>
@@ -5550,7 +5613,7 @@
                         <a:t>86.63</a:t>
                       </a:r>
                       <a:endParaRPr b="0" lang="en-US" sz="1600" spc="-1" strike="noStrike">
-                        <a:latin typeface="Times New Roman"/>
+                        <a:latin typeface="Arial"/>
                       </a:endParaRPr>
                     </a:p>
                   </a:txBody>
@@ -5628,7 +5691,7 @@
         <p:spPr>
           <a:xfrm>
             <a:off x="506160" y="69120"/>
-            <a:ext cx="8904960" cy="493920"/>
+            <a:ext cx="8904600" cy="493560"/>
           </a:xfrm>
           <a:prstGeom prst="rect">
             <a:avLst/>
@@ -5673,7 +5736,7 @@
         <p:spPr>
           <a:xfrm>
             <a:off x="457560" y="1170360"/>
-            <a:ext cx="11734200" cy="429480"/>
+            <a:ext cx="11733840" cy="429120"/>
           </a:xfrm>
           <a:prstGeom prst="rect">
             <a:avLst/>
@@ -5887,7 +5950,7 @@
         <p:spPr>
           <a:xfrm>
             <a:off x="428760" y="71640"/>
-            <a:ext cx="3336120" cy="541440"/>
+            <a:ext cx="3335760" cy="541080"/>
           </a:xfrm>
           <a:prstGeom prst="rect">
             <a:avLst/>
@@ -5939,7 +6002,7 @@
         <p:spPr>
           <a:xfrm>
             <a:off x="457200" y="2057400"/>
-            <a:ext cx="4342680" cy="345600"/>
+            <a:ext cx="4342320" cy="345240"/>
           </a:xfrm>
           <a:prstGeom prst="rect">
             <a:avLst/>
@@ -5965,7 +6028,7 @@
         <p:spPr>
           <a:xfrm>
             <a:off x="457200" y="1457640"/>
-            <a:ext cx="10514880" cy="3488040"/>
+            <a:ext cx="10514520" cy="3487680"/>
           </a:xfrm>
           <a:prstGeom prst="rect">
             <a:avLst/>
@@ -6184,7 +6247,7 @@
         <p:spPr>
           <a:xfrm>
             <a:off x="506160" y="69120"/>
-            <a:ext cx="8904960" cy="493920"/>
+            <a:ext cx="8904600" cy="493560"/>
           </a:xfrm>
           <a:prstGeom prst="rect">
             <a:avLst/>
@@ -6229,7 +6292,7 @@
         <p:spPr>
           <a:xfrm>
             <a:off x="457920" y="1071000"/>
-            <a:ext cx="10514880" cy="769320"/>
+            <a:ext cx="10514520" cy="768960"/>
           </a:xfrm>
           <a:prstGeom prst="rect">
             <a:avLst/>
@@ -6326,7 +6389,7 @@
         <p:spPr>
           <a:xfrm>
             <a:off x="506160" y="69120"/>
-            <a:ext cx="8904960" cy="493920"/>
+            <a:ext cx="8904600" cy="493560"/>
           </a:xfrm>
           <a:prstGeom prst="rect">
             <a:avLst/>
@@ -6395,7 +6458,7 @@
                         <a:buNone/>
                       </a:pPr>
                       <a:endParaRPr b="0" lang="en-US" sz="1800" spc="-1" strike="noStrike">
-                        <a:latin typeface="Times New Roman"/>
+                        <a:latin typeface="Arial"/>
                       </a:endParaRPr>
                     </a:p>
                     <a:p>
@@ -6406,7 +6469,7 @@
                         <a:buNone/>
                       </a:pPr>
                       <a:endParaRPr b="0" lang="en-US" sz="1800" spc="-1" strike="noStrike">
-                        <a:latin typeface="Times New Roman"/>
+                        <a:latin typeface="Arial"/>
                       </a:endParaRPr>
                     </a:p>
                   </a:txBody>
@@ -6455,7 +6518,7 @@
                         <a:t>Mean</a:t>
                       </a:r>
                       <a:endParaRPr b="0" lang="en-US" sz="1800" spc="-1" strike="noStrike">
-                        <a:latin typeface="Times New Roman"/>
+                        <a:latin typeface="Arial"/>
                       </a:endParaRPr>
                     </a:p>
                   </a:txBody>
@@ -6504,7 +6567,7 @@
                         <a:t>SD</a:t>
                       </a:r>
                       <a:endParaRPr b="0" lang="en-US" sz="1800" spc="-1" strike="noStrike">
-                        <a:latin typeface="Times New Roman"/>
+                        <a:latin typeface="Arial"/>
                       </a:endParaRPr>
                     </a:p>
                   </a:txBody>
@@ -6555,7 +6618,7 @@
                         <a:t>PTH</a:t>
                       </a:r>
                       <a:endParaRPr b="0" lang="en-US" sz="1800" spc="-1" strike="noStrike">
-                        <a:latin typeface="Times New Roman"/>
+                        <a:latin typeface="Arial"/>
                       </a:endParaRPr>
                     </a:p>
                   </a:txBody>
@@ -6604,7 +6667,7 @@
                         <a:t>500</a:t>
                       </a:r>
                       <a:endParaRPr b="0" lang="en-US" sz="2400" spc="-1" strike="noStrike">
-                        <a:latin typeface="Times New Roman"/>
+                        <a:latin typeface="Arial"/>
                       </a:endParaRPr>
                     </a:p>
                   </a:txBody>
@@ -6653,7 +6716,7 @@
                         <a:t>425</a:t>
                       </a:r>
                       <a:endParaRPr b="0" lang="en-US" sz="2400" spc="-1" strike="noStrike">
-                        <a:latin typeface="Times New Roman"/>
+                        <a:latin typeface="Arial"/>
                       </a:endParaRPr>
                     </a:p>
                   </a:txBody>
@@ -6704,7 +6767,7 @@
                         <a:t>Calcium</a:t>
                       </a:r>
                       <a:endParaRPr b="0" lang="en-US" sz="1800" spc="-1" strike="noStrike">
-                        <a:latin typeface="Times New Roman"/>
+                        <a:latin typeface="Arial"/>
                       </a:endParaRPr>
                     </a:p>
                   </a:txBody>
@@ -6753,7 +6816,7 @@
                         <a:t>9.1</a:t>
                       </a:r>
                       <a:endParaRPr b="0" lang="en-US" sz="2400" spc="-1" strike="noStrike">
-                        <a:latin typeface="Times New Roman"/>
+                        <a:latin typeface="Arial"/>
                       </a:endParaRPr>
                     </a:p>
                   </a:txBody>
@@ -6802,7 +6865,7 @@
                         <a:t>0.7</a:t>
                       </a:r>
                       <a:endParaRPr b="0" lang="en-US" sz="2400" spc="-1" strike="noStrike">
-                        <a:latin typeface="Times New Roman"/>
+                        <a:latin typeface="Arial"/>
                       </a:endParaRPr>
                     </a:p>
                   </a:txBody>
@@ -6853,7 +6916,7 @@
                         <a:t>Phosphorus</a:t>
                       </a:r>
                       <a:endParaRPr b="0" lang="en-US" sz="1800" spc="-1" strike="noStrike">
-                        <a:latin typeface="Times New Roman"/>
+                        <a:latin typeface="Arial"/>
                       </a:endParaRPr>
                     </a:p>
                   </a:txBody>
@@ -6902,7 +6965,7 @@
                         <a:t>5.5</a:t>
                       </a:r>
                       <a:endParaRPr b="0" lang="en-US" sz="2400" spc="-1" strike="noStrike">
-                        <a:latin typeface="Times New Roman"/>
+                        <a:latin typeface="Arial"/>
                       </a:endParaRPr>
                     </a:p>
                   </a:txBody>
@@ -6951,7 +7014,7 @@
                         <a:t>1.7</a:t>
                       </a:r>
                       <a:endParaRPr b="0" lang="en-US" sz="2400" spc="-1" strike="noStrike">
-                        <a:latin typeface="Times New Roman"/>
+                        <a:latin typeface="Arial"/>
                       </a:endParaRPr>
                     </a:p>
                   </a:txBody>
@@ -6995,7 +7058,7 @@
         <p:spPr>
           <a:xfrm>
             <a:off x="457200" y="5228640"/>
-            <a:ext cx="10514880" cy="769320"/>
+            <a:ext cx="10514520" cy="768960"/>
           </a:xfrm>
           <a:prstGeom prst="rect">
             <a:avLst/>
@@ -7088,7 +7151,7 @@
         <p:spPr>
           <a:xfrm>
             <a:off x="672480" y="992880"/>
-            <a:ext cx="10756080" cy="4113000"/>
+            <a:ext cx="10755720" cy="4113000"/>
           </a:xfrm>
           <a:prstGeom prst="rect">
             <a:avLst/>
@@ -7228,7 +7291,7 @@
         <p:spPr>
           <a:xfrm>
             <a:off x="506160" y="69120"/>
-            <a:ext cx="8904960" cy="493920"/>
+            <a:ext cx="8904600" cy="493560"/>
           </a:xfrm>
           <a:prstGeom prst="rect">
             <a:avLst/>
@@ -7272,7 +7335,7 @@
         </p:nvGraphicFramePr>
         <p:xfrm>
           <a:off x="2574720" y="3330720"/>
-          <a:ext cx="7239240" cy="1457640"/>
+          <a:ext cx="4825800" cy="1457640"/>
         </p:xfrm>
         <a:graphic>
           <a:graphicData uri="http://schemas.openxmlformats.org/drawingml/2006/table">
@@ -7483,7 +7546,7 @@
         <p:spPr>
           <a:xfrm>
             <a:off x="228600" y="1756800"/>
-            <a:ext cx="10514880" cy="1449000"/>
+            <a:ext cx="10514520" cy="1448640"/>
           </a:xfrm>
           <a:prstGeom prst="rect">
             <a:avLst/>
@@ -7612,7 +7675,7 @@
         <p:spPr>
           <a:xfrm>
             <a:off x="506160" y="69120"/>
-            <a:ext cx="8904960" cy="493920"/>
+            <a:ext cx="8904600" cy="493560"/>
           </a:xfrm>
           <a:prstGeom prst="rect">
             <a:avLst/>
@@ -7657,7 +7720,7 @@
         <p:spPr>
           <a:xfrm>
             <a:off x="228600" y="1361520"/>
-            <a:ext cx="10514880" cy="1109160"/>
+            <a:ext cx="10514520" cy="1108800"/>
           </a:xfrm>
           <a:prstGeom prst="rect">
             <a:avLst/>
@@ -7740,7 +7803,7 @@
         </p:nvGraphicFramePr>
         <p:xfrm>
           <a:off x="3563280" y="3012120"/>
-          <a:ext cx="3382920" cy="2744640"/>
+          <a:ext cx="3382920" cy="2488680"/>
         </p:xfrm>
         <a:graphic>
           <a:graphicData uri="http://schemas.openxmlformats.org/drawingml/2006/table">
@@ -7812,6 +7875,9 @@
                     </a:bodyPr>
                     <a:p>
                       <a:pPr algn="ctr">
+                        <a:lnSpc>
+                          <a:spcPct val="100000"/>
+                        </a:lnSpc>
                         <a:buNone/>
                       </a:pPr>
                       <a:r>
@@ -7887,7 +7953,7 @@
                         <a:t>PTH</a:t>
                       </a:r>
                       <a:endParaRPr b="0" lang="en-US" sz="1800" spc="-1" strike="noStrike">
-                        <a:latin typeface="Times New Roman"/>
+                        <a:latin typeface="Arial"/>
                       </a:endParaRPr>
                     </a:p>
                   </a:txBody>
@@ -7936,7 +8002,7 @@
                         <a:t>1.5</a:t>
                       </a:r>
                       <a:endParaRPr b="0" lang="en-US" sz="2400" spc="-1" strike="noStrike">
-                        <a:latin typeface="Times New Roman"/>
+                        <a:latin typeface="Arial"/>
                       </a:endParaRPr>
                     </a:p>
                   </a:txBody>
@@ -7987,7 +8053,7 @@
                         <a:t>Calcium</a:t>
                       </a:r>
                       <a:endParaRPr b="0" lang="en-US" sz="1800" spc="-1" strike="noStrike">
-                        <a:latin typeface="Times New Roman"/>
+                        <a:latin typeface="Arial"/>
                       </a:endParaRPr>
                     </a:p>
                   </a:txBody>
@@ -8036,7 +8102,7 @@
                         <a:t>0.2</a:t>
                       </a:r>
                       <a:endParaRPr b="0" lang="en-US" sz="2400" spc="-1" strike="noStrike">
-                        <a:latin typeface="Times New Roman"/>
+                        <a:latin typeface="Arial"/>
                       </a:endParaRPr>
                     </a:p>
                   </a:txBody>
@@ -8087,7 +8153,7 @@
                         <a:t>Phosphorus</a:t>
                       </a:r>
                       <a:endParaRPr b="0" lang="en-US" sz="1800" spc="-1" strike="noStrike">
-                        <a:latin typeface="Times New Roman"/>
+                        <a:latin typeface="Arial"/>
                       </a:endParaRPr>
                     </a:p>
                   </a:txBody>
@@ -8136,7 +8202,7 @@
                         <a:t>0.5</a:t>
                       </a:r>
                       <a:endParaRPr b="0" lang="en-US" sz="2400" spc="-1" strike="noStrike">
-                        <a:latin typeface="Times New Roman"/>
+                        <a:latin typeface="Arial"/>
                       </a:endParaRPr>
                     </a:p>
                   </a:txBody>
@@ -8214,7 +8280,7 @@
         <p:spPr>
           <a:xfrm>
             <a:off x="506160" y="69120"/>
-            <a:ext cx="8904960" cy="493920"/>
+            <a:ext cx="8904600" cy="493560"/>
           </a:xfrm>
           <a:prstGeom prst="rect">
             <a:avLst/>
@@ -8259,7 +8325,7 @@
         <p:spPr>
           <a:xfrm>
             <a:off x="450000" y="1143000"/>
-            <a:ext cx="10514880" cy="429480"/>
+            <a:ext cx="10514520" cy="429120"/>
           </a:xfrm>
           <a:prstGeom prst="rect">
             <a:avLst/>
@@ -8388,7 +8454,7 @@
         <p:spPr>
           <a:xfrm>
             <a:off x="506160" y="69120"/>
-            <a:ext cx="8904960" cy="493920"/>
+            <a:ext cx="8904600" cy="493560"/>
           </a:xfrm>
           <a:prstGeom prst="rect">
             <a:avLst/>
@@ -8433,7 +8499,7 @@
         <p:spPr>
           <a:xfrm>
             <a:off x="2286000" y="999000"/>
-            <a:ext cx="10514880" cy="429480"/>
+            <a:ext cx="10514520" cy="429120"/>
           </a:xfrm>
           <a:prstGeom prst="rect">
             <a:avLst/>
@@ -8489,7 +8555,7 @@
         <p:spPr>
           <a:xfrm>
             <a:off x="2309040" y="1600200"/>
-            <a:ext cx="7063560" cy="4624920"/>
+            <a:ext cx="7063200" cy="4624560"/>
           </a:xfrm>
           <a:prstGeom prst="rect">
             <a:avLst/>
@@ -8542,7 +8608,7 @@
         <p:spPr>
           <a:xfrm>
             <a:off x="506160" y="69120"/>
-            <a:ext cx="8904960" cy="493920"/>
+            <a:ext cx="8904600" cy="493560"/>
           </a:xfrm>
           <a:prstGeom prst="rect">
             <a:avLst/>
@@ -8587,7 +8653,7 @@
         <p:spPr>
           <a:xfrm>
             <a:off x="2286000" y="999000"/>
-            <a:ext cx="10514880" cy="429480"/>
+            <a:ext cx="10514520" cy="429120"/>
           </a:xfrm>
           <a:prstGeom prst="rect">
             <a:avLst/>
@@ -8643,7 +8709,7 @@
         <p:spPr>
           <a:xfrm>
             <a:off x="1920240" y="1443600"/>
-            <a:ext cx="7909560" cy="4719960"/>
+            <a:ext cx="7909200" cy="4719600"/>
           </a:xfrm>
           <a:prstGeom prst="rect">
             <a:avLst/>

</xml_diff>